<commit_message>
Working on Hot Hand Fallacy example
Cleaning up MATLAB code and converting to Python (on Google CoLab)
</commit_message>
<xml_diff>
--- a/Unit #1 Probability/Hot Hand Fallacy/HotHandFallacy.pptx
+++ b/Unit #1 Probability/Hot Hand Fallacy/HotHandFallacy.pptx
@@ -249,7 +249,7 @@
           <a:p>
             <a:fld id="{AF6EEAC4-0493-40D2-8C4A-253EF60409B2}" type="datetimeFigureOut">
               <a:rPr lang="en-US" smtClean="0"/>
-              <a:t>8/12/2019</a:t>
+              <a:t>8/3/2022</a:t>
             </a:fld>
             <a:endParaRPr lang="en-US"/>
           </a:p>
@@ -419,7 +419,7 @@
           <a:p>
             <a:fld id="{AF6EEAC4-0493-40D2-8C4A-253EF60409B2}" type="datetimeFigureOut">
               <a:rPr lang="en-US" smtClean="0"/>
-              <a:t>8/12/2019</a:t>
+              <a:t>8/3/2022</a:t>
             </a:fld>
             <a:endParaRPr lang="en-US"/>
           </a:p>
@@ -599,7 +599,7 @@
           <a:p>
             <a:fld id="{AF6EEAC4-0493-40D2-8C4A-253EF60409B2}" type="datetimeFigureOut">
               <a:rPr lang="en-US" smtClean="0"/>
-              <a:t>8/12/2019</a:t>
+              <a:t>8/3/2022</a:t>
             </a:fld>
             <a:endParaRPr lang="en-US"/>
           </a:p>
@@ -769,7 +769,7 @@
           <a:p>
             <a:fld id="{AF6EEAC4-0493-40D2-8C4A-253EF60409B2}" type="datetimeFigureOut">
               <a:rPr lang="en-US" smtClean="0"/>
-              <a:t>8/12/2019</a:t>
+              <a:t>8/3/2022</a:t>
             </a:fld>
             <a:endParaRPr lang="en-US"/>
           </a:p>
@@ -1015,7 +1015,7 @@
           <a:p>
             <a:fld id="{AF6EEAC4-0493-40D2-8C4A-253EF60409B2}" type="datetimeFigureOut">
               <a:rPr lang="en-US" smtClean="0"/>
-              <a:t>8/12/2019</a:t>
+              <a:t>8/3/2022</a:t>
             </a:fld>
             <a:endParaRPr lang="en-US"/>
           </a:p>
@@ -1247,7 +1247,7 @@
           <a:p>
             <a:fld id="{AF6EEAC4-0493-40D2-8C4A-253EF60409B2}" type="datetimeFigureOut">
               <a:rPr lang="en-US" smtClean="0"/>
-              <a:t>8/12/2019</a:t>
+              <a:t>8/3/2022</a:t>
             </a:fld>
             <a:endParaRPr lang="en-US"/>
           </a:p>
@@ -1614,7 +1614,7 @@
           <a:p>
             <a:fld id="{AF6EEAC4-0493-40D2-8C4A-253EF60409B2}" type="datetimeFigureOut">
               <a:rPr lang="en-US" smtClean="0"/>
-              <a:t>8/12/2019</a:t>
+              <a:t>8/3/2022</a:t>
             </a:fld>
             <a:endParaRPr lang="en-US"/>
           </a:p>
@@ -1732,7 +1732,7 @@
           <a:p>
             <a:fld id="{AF6EEAC4-0493-40D2-8C4A-253EF60409B2}" type="datetimeFigureOut">
               <a:rPr lang="en-US" smtClean="0"/>
-              <a:t>8/12/2019</a:t>
+              <a:t>8/3/2022</a:t>
             </a:fld>
             <a:endParaRPr lang="en-US"/>
           </a:p>
@@ -1827,7 +1827,7 @@
           <a:p>
             <a:fld id="{AF6EEAC4-0493-40D2-8C4A-253EF60409B2}" type="datetimeFigureOut">
               <a:rPr lang="en-US" smtClean="0"/>
-              <a:t>8/12/2019</a:t>
+              <a:t>8/3/2022</a:t>
             </a:fld>
             <a:endParaRPr lang="en-US"/>
           </a:p>
@@ -2104,7 +2104,7 @@
           <a:p>
             <a:fld id="{AF6EEAC4-0493-40D2-8C4A-253EF60409B2}" type="datetimeFigureOut">
               <a:rPr lang="en-US" smtClean="0"/>
-              <a:t>8/12/2019</a:t>
+              <a:t>8/3/2022</a:t>
             </a:fld>
             <a:endParaRPr lang="en-US"/>
           </a:p>
@@ -2357,7 +2357,7 @@
           <a:p>
             <a:fld id="{AF6EEAC4-0493-40D2-8C4A-253EF60409B2}" type="datetimeFigureOut">
               <a:rPr lang="en-US" smtClean="0"/>
-              <a:t>8/12/2019</a:t>
+              <a:t>8/3/2022</a:t>
             </a:fld>
             <a:endParaRPr lang="en-US"/>
           </a:p>
@@ -2570,7 +2570,7 @@
           <a:p>
             <a:fld id="{AF6EEAC4-0493-40D2-8C4A-253EF60409B2}" type="datetimeFigureOut">
               <a:rPr lang="en-US" smtClean="0"/>
-              <a:t>8/12/2019</a:t>
+              <a:t>8/3/2022</a:t>
             </a:fld>
             <a:endParaRPr lang="en-US"/>
           </a:p>

</xml_diff>